<commit_message>
added read me files
</commit_message>
<xml_diff>
--- a/walters_presentation_final.pptx
+++ b/walters_presentation_final.pptx
@@ -10440,14 +10440,10 @@
           <a:p>
             <a:r>
               <a:rPr lang="en-US" dirty="0" smtClean="0"/>
-              <a:t>Examine the unexpected mutations to identify possibly permissive mutations which </a:t>
-            </a:r>
-            <a:r>
-              <a:rPr lang="en-US" smtClean="0"/>
-              <a:t>precede </a:t>
-            </a:r>
-            <a:r>
-              <a:rPr lang="en-US" smtClean="0"/>
+              <a:t>Examine the unexpected mutations to identify possibly permissive mutations which precede </a:t>
+            </a:r>
+            <a:r>
+              <a:rPr lang="en-US" dirty="0" smtClean="0"/>
               <a:t>them. </a:t>
             </a:r>
             <a:endParaRPr lang="en-US" dirty="0" smtClean="0"/>
@@ -11799,7 +11795,7 @@
         </p:nvSpPr>
         <p:spPr>
           <a:xfrm>
-            <a:off x="838200" y="1931366"/>
+            <a:off x="838200" y="1928667"/>
             <a:ext cx="10515600" cy="4351338"/>
           </a:xfrm>
         </p:spPr>
@@ -11978,6 +11974,9 @@
                     <p:cTn id="3" fill="hold">
                       <p:stCondLst>
                         <p:cond delay="indefinite"/>
+                        <p:cond evt="onBegin" delay="0">
+                          <p:tn val="2"/>
+                        </p:cond>
                       </p:stCondLst>
                       <p:childTnLst>
                         <p:par>
@@ -11987,28 +11986,61 @@
                             </p:stCondLst>
                             <p:childTnLst>
                               <p:par>
-                                <p:cTn id="5" presetID="9" presetClass="exit" presetSubtype="0" fill="hold" nodeType="clickEffect">
+                                <p:cTn id="5" presetID="1" presetClass="entr" presetSubtype="0" fill="hold" grpId="0" nodeType="withEffect">
                                   <p:stCondLst>
                                     <p:cond delay="0"/>
                                   </p:stCondLst>
                                   <p:childTnLst>
-                                    <p:animEffect transition="out" filter="dissolve">
-                                      <p:cBhvr>
-                                        <p:cTn id="6" dur="500"/>
-                                        <p:tgtEl>
-                                          <p:spTgt spid="3">
-                                            <p:txEl>
-                                              <p:pRg st="0" end="0"/>
-                                            </p:txEl>
-                                          </p:spTgt>
-                                        </p:tgtEl>
-                                      </p:cBhvr>
-                                    </p:animEffect>
                                     <p:set>
                                       <p:cBhvr>
-                                        <p:cTn id="7" dur="1" fill="hold">
+                                        <p:cTn id="6" dur="1" fill="hold">
                                           <p:stCondLst>
-                                            <p:cond delay="499"/>
+                                            <p:cond delay="0"/>
+                                          </p:stCondLst>
+                                        </p:cTn>
+                                        <p:tgtEl>
+                                          <p:spTgt spid="7"/>
+                                        </p:tgtEl>
+                                        <p:attrNameLst>
+                                          <p:attrName>style.visibility</p:attrName>
+                                        </p:attrNameLst>
+                                      </p:cBhvr>
+                                      <p:to>
+                                        <p:strVal val="visible"/>
+                                      </p:to>
+                                    </p:set>
+                                  </p:childTnLst>
+                                </p:cTn>
+                              </p:par>
+                            </p:childTnLst>
+                          </p:cTn>
+                        </p:par>
+                      </p:childTnLst>
+                    </p:cTn>
+                  </p:par>
+                  <p:par>
+                    <p:cTn id="7" fill="hold">
+                      <p:stCondLst>
+                        <p:cond delay="indefinite"/>
+                      </p:stCondLst>
+                      <p:childTnLst>
+                        <p:par>
+                          <p:cTn id="8" fill="hold">
+                            <p:stCondLst>
+                              <p:cond delay="0"/>
+                            </p:stCondLst>
+                            <p:childTnLst>
+                              <p:par>
+                                <p:cTn id="9" presetID="1" presetClass="exit" presetSubtype="0" fill="hold" grpId="0" nodeType="clickEffect">
+                                  <p:stCondLst>
+                                    <p:cond delay="0"/>
+                                  </p:stCondLst>
+                                  <p:childTnLst>
+                                    <p:set>
+                                      <p:cBhvr>
+                                        <p:cTn id="10" dur="1" fill="hold">
+                                          <p:stCondLst>
+                                            <p:cond delay="0"/>
                                           </p:stCondLst>
                                         </p:cTn>
                                         <p:tgtEl>
@@ -12029,47 +12061,17 @@
                                   </p:childTnLst>
                                 </p:cTn>
                               </p:par>
-                            </p:childTnLst>
-                          </p:cTn>
-                        </p:par>
-                      </p:childTnLst>
-                    </p:cTn>
-                  </p:par>
-                  <p:par>
-                    <p:cTn id="8" fill="hold">
-                      <p:stCondLst>
-                        <p:cond delay="indefinite"/>
-                      </p:stCondLst>
-                      <p:childTnLst>
-                        <p:par>
-                          <p:cTn id="9" fill="hold">
-                            <p:stCondLst>
-                              <p:cond delay="0"/>
-                            </p:stCondLst>
-                            <p:childTnLst>
                               <p:par>
-                                <p:cTn id="10" presetID="9" presetClass="exit" presetSubtype="0" fill="hold" nodeType="clickEffect">
+                                <p:cTn id="11" presetID="1" presetClass="exit" presetSubtype="0" fill="hold" grpId="0" nodeType="withEffect">
                                   <p:stCondLst>
                                     <p:cond delay="0"/>
                                   </p:stCondLst>
                                   <p:childTnLst>
-                                    <p:animEffect transition="out" filter="dissolve">
-                                      <p:cBhvr>
-                                        <p:cTn id="11" dur="500"/>
-                                        <p:tgtEl>
-                                          <p:spTgt spid="3">
-                                            <p:txEl>
-                                              <p:pRg st="1" end="1"/>
-                                            </p:txEl>
-                                          </p:spTgt>
-                                        </p:tgtEl>
-                                      </p:cBhvr>
-                                    </p:animEffect>
                                     <p:set>
                                       <p:cBhvr>
                                         <p:cTn id="12" dur="1" fill="hold">
                                           <p:stCondLst>
-                                            <p:cond delay="499"/>
+                                            <p:cond delay="0"/>
                                           </p:stCondLst>
                                         </p:cTn>
                                         <p:tgtEl>
@@ -12091,28 +12093,16 @@
                                 </p:cTn>
                               </p:par>
                               <p:par>
-                                <p:cTn id="13" presetID="9" presetClass="exit" presetSubtype="0" fill="hold" nodeType="withEffect">
+                                <p:cTn id="13" presetID="1" presetClass="exit" presetSubtype="0" fill="hold" grpId="0" nodeType="withEffect">
                                   <p:stCondLst>
                                     <p:cond delay="0"/>
                                   </p:stCondLst>
                                   <p:childTnLst>
-                                    <p:animEffect transition="out" filter="dissolve">
-                                      <p:cBhvr>
-                                        <p:cTn id="14" dur="500"/>
-                                        <p:tgtEl>
-                                          <p:spTgt spid="3">
-                                            <p:txEl>
-                                              <p:pRg st="2" end="2"/>
-                                            </p:txEl>
-                                          </p:spTgt>
-                                        </p:tgtEl>
-                                      </p:cBhvr>
-                                    </p:animEffect>
                                     <p:set>
                                       <p:cBhvr>
-                                        <p:cTn id="15" dur="1" fill="hold">
+                                        <p:cTn id="14" dur="1" fill="hold">
                                           <p:stCondLst>
-                                            <p:cond delay="499"/>
+                                            <p:cond delay="0"/>
                                           </p:stCondLst>
                                         </p:cTn>
                                         <p:tgtEl>
@@ -12134,28 +12124,16 @@
                                 </p:cTn>
                               </p:par>
                               <p:par>
-                                <p:cTn id="16" presetID="9" presetClass="exit" presetSubtype="0" fill="hold" nodeType="withEffect">
+                                <p:cTn id="15" presetID="1" presetClass="exit" presetSubtype="0" fill="hold" grpId="0" nodeType="withEffect">
                                   <p:stCondLst>
                                     <p:cond delay="0"/>
                                   </p:stCondLst>
                                   <p:childTnLst>
-                                    <p:animEffect transition="out" filter="dissolve">
-                                      <p:cBhvr>
-                                        <p:cTn id="17" dur="500"/>
-                                        <p:tgtEl>
-                                          <p:spTgt spid="3">
-                                            <p:txEl>
-                                              <p:pRg st="3" end="3"/>
-                                            </p:txEl>
-                                          </p:spTgt>
-                                        </p:tgtEl>
-                                      </p:cBhvr>
-                                    </p:animEffect>
                                     <p:set>
                                       <p:cBhvr>
-                                        <p:cTn id="18" dur="1" fill="hold">
+                                        <p:cTn id="16" dur="1" fill="hold">
                                           <p:stCondLst>
-                                            <p:cond delay="499"/>
+                                            <p:cond delay="0"/>
                                           </p:stCondLst>
                                         </p:cTn>
                                         <p:tgtEl>
@@ -12177,28 +12155,16 @@
                                 </p:cTn>
                               </p:par>
                               <p:par>
-                                <p:cTn id="19" presetID="9" presetClass="exit" presetSubtype="0" fill="hold" nodeType="withEffect">
+                                <p:cTn id="17" presetID="1" presetClass="exit" presetSubtype="0" fill="hold" grpId="0" nodeType="withEffect">
                                   <p:stCondLst>
                                     <p:cond delay="0"/>
                                   </p:stCondLst>
                                   <p:childTnLst>
-                                    <p:animEffect transition="out" filter="dissolve">
-                                      <p:cBhvr>
-                                        <p:cTn id="20" dur="500"/>
-                                        <p:tgtEl>
-                                          <p:spTgt spid="3">
-                                            <p:txEl>
-                                              <p:pRg st="4" end="4"/>
-                                            </p:txEl>
-                                          </p:spTgt>
-                                        </p:tgtEl>
-                                      </p:cBhvr>
-                                    </p:animEffect>
                                     <p:set>
                                       <p:cBhvr>
-                                        <p:cTn id="21" dur="1" fill="hold">
+                                        <p:cTn id="18" dur="1" fill="hold">
                                           <p:stCondLst>
-                                            <p:cond delay="499"/>
+                                            <p:cond delay="0"/>
                                           </p:stCondLst>
                                         </p:cTn>
                                         <p:tgtEl>
@@ -12220,28 +12186,16 @@
                                 </p:cTn>
                               </p:par>
                               <p:par>
-                                <p:cTn id="22" presetID="9" presetClass="exit" presetSubtype="0" fill="hold" nodeType="withEffect">
+                                <p:cTn id="19" presetID="1" presetClass="exit" presetSubtype="0" fill="hold" grpId="0" nodeType="withEffect">
                                   <p:stCondLst>
                                     <p:cond delay="0"/>
                                   </p:stCondLst>
                                   <p:childTnLst>
-                                    <p:animEffect transition="out" filter="dissolve">
-                                      <p:cBhvr>
-                                        <p:cTn id="23" dur="500"/>
-                                        <p:tgtEl>
-                                          <p:spTgt spid="3">
-                                            <p:txEl>
-                                              <p:pRg st="5" end="5"/>
-                                            </p:txEl>
-                                          </p:spTgt>
-                                        </p:tgtEl>
-                                      </p:cBhvr>
-                                    </p:animEffect>
                                     <p:set>
                                       <p:cBhvr>
-                                        <p:cTn id="24" dur="1" fill="hold">
+                                        <p:cTn id="20" dur="1" fill="hold">
                                           <p:stCondLst>
-                                            <p:cond delay="499"/>
+                                            <p:cond delay="0"/>
                                           </p:stCondLst>
                                         </p:cTn>
                                         <p:tgtEl>
@@ -12263,28 +12217,16 @@
                                 </p:cTn>
                               </p:par>
                               <p:par>
-                                <p:cTn id="25" presetID="9" presetClass="exit" presetSubtype="0" fill="hold" nodeType="withEffect">
+                                <p:cTn id="21" presetID="1" presetClass="exit" presetSubtype="0" fill="hold" grpId="0" nodeType="withEffect">
                                   <p:stCondLst>
                                     <p:cond delay="0"/>
                                   </p:stCondLst>
                                   <p:childTnLst>
-                                    <p:animEffect transition="out" filter="dissolve">
-                                      <p:cBhvr>
-                                        <p:cTn id="26" dur="500"/>
-                                        <p:tgtEl>
-                                          <p:spTgt spid="3">
-                                            <p:txEl>
-                                              <p:pRg st="6" end="6"/>
-                                            </p:txEl>
-                                          </p:spTgt>
-                                        </p:tgtEl>
-                                      </p:cBhvr>
-                                    </p:animEffect>
                                     <p:set>
                                       <p:cBhvr>
-                                        <p:cTn id="27" dur="1" fill="hold">
+                                        <p:cTn id="22" dur="1" fill="hold">
                                           <p:stCondLst>
-                                            <p:cond delay="499"/>
+                                            <p:cond delay="0"/>
                                           </p:stCondLst>
                                         </p:cTn>
                                         <p:tgtEl>
@@ -12332,6 +12274,10 @@
         </p:cTn>
       </p:par>
     </p:tnLst>
+    <p:bldLst>
+      <p:bldP spid="7" grpId="0"/>
+      <p:bldP spid="3" grpId="0" uiExpand="1" build="p"/>
+    </p:bldLst>
   </p:timing>
 </p:sld>
 </file>

</xml_diff>